<commit_message>
chnaged keypad pins for breadboard
</commit_message>
<xml_diff>
--- a/docs/planning/PinDiagramFlowChart.pptx
+++ b/docs/planning/PinDiagramFlowChart.pptx
@@ -267,7 +267,7 @@
           <a:p>
             <a:fld id="{43859641-87B3-4D4C-932C-222F1A0ADC66}" type="datetimeFigureOut">
               <a:rPr lang="en-US" smtClean="0"/>
-              <a:t>4/1/2025</a:t>
+              <a:t>4/2/2025</a:t>
             </a:fld>
             <a:endParaRPr lang="en-US"/>
           </a:p>
@@ -465,7 +465,7 @@
           <a:p>
             <a:fld id="{43859641-87B3-4D4C-932C-222F1A0ADC66}" type="datetimeFigureOut">
               <a:rPr lang="en-US" smtClean="0"/>
-              <a:t>4/1/2025</a:t>
+              <a:t>4/2/2025</a:t>
             </a:fld>
             <a:endParaRPr lang="en-US"/>
           </a:p>
@@ -673,7 +673,7 @@
           <a:p>
             <a:fld id="{43859641-87B3-4D4C-932C-222F1A0ADC66}" type="datetimeFigureOut">
               <a:rPr lang="en-US" smtClean="0"/>
-              <a:t>4/1/2025</a:t>
+              <a:t>4/2/2025</a:t>
             </a:fld>
             <a:endParaRPr lang="en-US"/>
           </a:p>
@@ -871,7 +871,7 @@
           <a:p>
             <a:fld id="{43859641-87B3-4D4C-932C-222F1A0ADC66}" type="datetimeFigureOut">
               <a:rPr lang="en-US" smtClean="0"/>
-              <a:t>4/1/2025</a:t>
+              <a:t>4/2/2025</a:t>
             </a:fld>
             <a:endParaRPr lang="en-US"/>
           </a:p>
@@ -1146,7 +1146,7 @@
           <a:p>
             <a:fld id="{43859641-87B3-4D4C-932C-222F1A0ADC66}" type="datetimeFigureOut">
               <a:rPr lang="en-US" smtClean="0"/>
-              <a:t>4/1/2025</a:t>
+              <a:t>4/2/2025</a:t>
             </a:fld>
             <a:endParaRPr lang="en-US"/>
           </a:p>
@@ -1411,7 +1411,7 @@
           <a:p>
             <a:fld id="{43859641-87B3-4D4C-932C-222F1A0ADC66}" type="datetimeFigureOut">
               <a:rPr lang="en-US" smtClean="0"/>
-              <a:t>4/1/2025</a:t>
+              <a:t>4/2/2025</a:t>
             </a:fld>
             <a:endParaRPr lang="en-US"/>
           </a:p>
@@ -1823,7 +1823,7 @@
           <a:p>
             <a:fld id="{43859641-87B3-4D4C-932C-222F1A0ADC66}" type="datetimeFigureOut">
               <a:rPr lang="en-US" smtClean="0"/>
-              <a:t>4/1/2025</a:t>
+              <a:t>4/2/2025</a:t>
             </a:fld>
             <a:endParaRPr lang="en-US"/>
           </a:p>
@@ -1964,7 +1964,7 @@
           <a:p>
             <a:fld id="{43859641-87B3-4D4C-932C-222F1A0ADC66}" type="datetimeFigureOut">
               <a:rPr lang="en-US" smtClean="0"/>
-              <a:t>4/1/2025</a:t>
+              <a:t>4/2/2025</a:t>
             </a:fld>
             <a:endParaRPr lang="en-US"/>
           </a:p>
@@ -2077,7 +2077,7 @@
           <a:p>
             <a:fld id="{43859641-87B3-4D4C-932C-222F1A0ADC66}" type="datetimeFigureOut">
               <a:rPr lang="en-US" smtClean="0"/>
-              <a:t>4/1/2025</a:t>
+              <a:t>4/2/2025</a:t>
             </a:fld>
             <a:endParaRPr lang="en-US"/>
           </a:p>
@@ -2388,7 +2388,7 @@
           <a:p>
             <a:fld id="{43859641-87B3-4D4C-932C-222F1A0ADC66}" type="datetimeFigureOut">
               <a:rPr lang="en-US" smtClean="0"/>
-              <a:t>4/1/2025</a:t>
+              <a:t>4/2/2025</a:t>
             </a:fld>
             <a:endParaRPr lang="en-US"/>
           </a:p>
@@ -2676,7 +2676,7 @@
           <a:p>
             <a:fld id="{43859641-87B3-4D4C-932C-222F1A0ADC66}" type="datetimeFigureOut">
               <a:rPr lang="en-US" smtClean="0"/>
-              <a:t>4/1/2025</a:t>
+              <a:t>4/2/2025</a:t>
             </a:fld>
             <a:endParaRPr lang="en-US"/>
           </a:p>
@@ -2917,7 +2917,7 @@
           <a:p>
             <a:fld id="{43859641-87B3-4D4C-932C-222F1A0ADC66}" type="datetimeFigureOut">
               <a:rPr lang="en-US" smtClean="0"/>
-              <a:t>4/1/2025</a:t>
+              <a:t>4/2/2025</a:t>
             </a:fld>
             <a:endParaRPr lang="en-US"/>
           </a:p>
@@ -3825,7 +3825,7 @@
           <a:p>
             <a:r>
               <a:rPr lang="en-US" b="1" dirty="0"/>
-              <a:t>P5.3</a:t>
+              <a:t>P1.5</a:t>
             </a:r>
           </a:p>
         </p:txBody>
@@ -3860,7 +3860,7 @@
           <a:p>
             <a:r>
               <a:rPr lang="en-US" b="1" dirty="0"/>
-              <a:t>P5.1</a:t>
+              <a:t>P1.6</a:t>
             </a:r>
           </a:p>
         </p:txBody>
@@ -3895,7 +3895,7 @@
           <a:p>
             <a:r>
               <a:rPr lang="en-US" b="1" dirty="0"/>
-              <a:t>P5.0</a:t>
+              <a:t>P1.7</a:t>
             </a:r>
           </a:p>
         </p:txBody>
@@ -3930,7 +3930,7 @@
           <a:p>
             <a:r>
               <a:rPr lang="en-US" b="1" dirty="0"/>
-              <a:t>P5.4</a:t>
+              <a:t>P2.0</a:t>
             </a:r>
           </a:p>
         </p:txBody>
@@ -4519,7 +4519,7 @@
           <a:p>
             <a:r>
               <a:rPr lang="en-US" b="1" dirty="0"/>
-              <a:t>P1.1</a:t>
+              <a:t>P2.1</a:t>
             </a:r>
           </a:p>
         </p:txBody>
@@ -4632,7 +4632,7 @@
           <a:p>
             <a:r>
               <a:rPr lang="en-US" b="1" dirty="0"/>
-              <a:t>P3.5</a:t>
+              <a:t>P2.2</a:t>
             </a:r>
           </a:p>
         </p:txBody>
@@ -4745,7 +4745,7 @@
           <a:p>
             <a:r>
               <a:rPr lang="en-US" b="1" dirty="0"/>
-              <a:t>P3.1</a:t>
+              <a:t>P2.3</a:t>
             </a:r>
           </a:p>
         </p:txBody>

</xml_diff>